<commit_message>
Modulo 3 - Clase 5 y Laboratorio 3
</commit_message>
<xml_diff>
--- a/Material pedagógico/Modulo 2/Clase 2/Clase 2 - Modulo 2.pptx
+++ b/Material pedagógico/Modulo 2/Clase 2/Clase 2 - Modulo 2.pptx
@@ -359,7 +359,7 @@
             <a:pPr indent="0" algn="r">
               <a:buNone/>
             </a:pPr>
-            <a:fld id="{BAB7BA54-8647-4A83-A729-C16C64D8E73D}" type="slidenum">
+            <a:fld id="{22E80CBB-5C65-4409-86AF-763B81D96D55}" type="slidenum">
               <a:rPr b="0" lang="es-CO" sz="1400" spc="-1" strike="noStrike">
                 <a:solidFill>
                   <a:srgbClr val="000000"/>
@@ -413,7 +413,7 @@
         <p:spPr>
           <a:xfrm>
             <a:off x="685800" y="1143000"/>
-            <a:ext cx="5484960" cy="3084840"/>
+            <a:ext cx="5484600" cy="3084480"/>
           </a:xfrm>
           <a:prstGeom prst="rect">
             <a:avLst/>
@@ -436,7 +436,7 @@
         <p:spPr>
           <a:xfrm>
             <a:off x="685800" y="4400640"/>
-            <a:ext cx="5484960" cy="3599280"/>
+            <a:ext cx="5484600" cy="3598920"/>
           </a:xfrm>
           <a:prstGeom prst="rect">
             <a:avLst/>
@@ -476,7 +476,7 @@
         <p:spPr>
           <a:xfrm>
             <a:off x="3884760" y="8685360"/>
-            <a:ext cx="2970360" cy="457200"/>
+            <a:ext cx="2970000" cy="456840"/>
           </a:xfrm>
           <a:prstGeom prst="rect">
             <a:avLst/>
@@ -517,7 +517,7 @@
                 <a:tab algn="l" pos="0"/>
               </a:tabLst>
             </a:pPr>
-            <a:fld id="{59BE186A-4885-49BA-8E89-EB87DA2F65AC}" type="slidenum">
+            <a:fld id="{1B60CC3F-67AE-41D1-847E-DABDD9C2D115}" type="slidenum">
               <a:rPr b="0" lang="es-CO" sz="1400" spc="-1" strike="noStrike">
                 <a:solidFill>
                   <a:srgbClr val="000000"/>
@@ -570,7 +570,7 @@
         <p:spPr>
           <a:xfrm>
             <a:off x="685800" y="1143000"/>
-            <a:ext cx="5484960" cy="3084840"/>
+            <a:ext cx="5484600" cy="3084480"/>
           </a:xfrm>
           <a:prstGeom prst="rect">
             <a:avLst/>
@@ -593,7 +593,7 @@
         <p:spPr>
           <a:xfrm>
             <a:off x="685800" y="4400640"/>
-            <a:ext cx="5484960" cy="3599280"/>
+            <a:ext cx="5484600" cy="3598920"/>
           </a:xfrm>
           <a:prstGeom prst="rect">
             <a:avLst/>
@@ -633,7 +633,7 @@
         <p:spPr>
           <a:xfrm>
             <a:off x="3884760" y="8685360"/>
-            <a:ext cx="2970360" cy="457200"/>
+            <a:ext cx="2970000" cy="456840"/>
           </a:xfrm>
           <a:prstGeom prst="rect">
             <a:avLst/>
@@ -674,7 +674,7 @@
                 <a:tab algn="l" pos="0"/>
               </a:tabLst>
             </a:pPr>
-            <a:fld id="{2CA2AEFC-4976-4B5A-B368-AA5F55DA086A}" type="slidenum">
+            <a:fld id="{C8BA4BB7-9A1D-43E5-ACD2-4DD7D51FBB2E}" type="slidenum">
               <a:rPr b="0" lang="es-CO" sz="1400" spc="-1" strike="noStrike">
                 <a:solidFill>
                   <a:srgbClr val="000000"/>
@@ -727,7 +727,7 @@
         <p:spPr>
           <a:xfrm>
             <a:off x="685800" y="1143000"/>
-            <a:ext cx="5484960" cy="3084840"/>
+            <a:ext cx="5484600" cy="3084480"/>
           </a:xfrm>
           <a:prstGeom prst="rect">
             <a:avLst/>
@@ -750,7 +750,7 @@
         <p:spPr>
           <a:xfrm>
             <a:off x="685800" y="4400640"/>
-            <a:ext cx="5484960" cy="3599280"/>
+            <a:ext cx="5484600" cy="3598920"/>
           </a:xfrm>
           <a:prstGeom prst="rect">
             <a:avLst/>
@@ -790,7 +790,7 @@
         <p:spPr>
           <a:xfrm>
             <a:off x="3884760" y="8685360"/>
-            <a:ext cx="2970360" cy="457200"/>
+            <a:ext cx="2970000" cy="456840"/>
           </a:xfrm>
           <a:prstGeom prst="rect">
             <a:avLst/>
@@ -831,7 +831,7 @@
                 <a:tab algn="l" pos="0"/>
               </a:tabLst>
             </a:pPr>
-            <a:fld id="{5C407108-C750-49A8-AF4C-6D21D1230C23}" type="slidenum">
+            <a:fld id="{F2D2ACF0-8DD1-478F-9B7A-0FD663F9B20C}" type="slidenum">
               <a:rPr b="0" lang="es-CO" sz="1400" spc="-1" strike="noStrike">
                 <a:solidFill>
                   <a:srgbClr val="000000"/>
@@ -884,7 +884,7 @@
         <p:spPr>
           <a:xfrm>
             <a:off x="685800" y="1143000"/>
-            <a:ext cx="5484960" cy="3084840"/>
+            <a:ext cx="5484600" cy="3084480"/>
           </a:xfrm>
           <a:prstGeom prst="rect">
             <a:avLst/>
@@ -907,7 +907,7 @@
         <p:spPr>
           <a:xfrm>
             <a:off x="685800" y="4400640"/>
-            <a:ext cx="5484960" cy="3599280"/>
+            <a:ext cx="5484600" cy="3598920"/>
           </a:xfrm>
           <a:prstGeom prst="rect">
             <a:avLst/>
@@ -947,7 +947,7 @@
         <p:spPr>
           <a:xfrm>
             <a:off x="3884760" y="8685360"/>
-            <a:ext cx="2970360" cy="457200"/>
+            <a:ext cx="2970000" cy="456840"/>
           </a:xfrm>
           <a:prstGeom prst="rect">
             <a:avLst/>
@@ -988,7 +988,7 @@
                 <a:tab algn="l" pos="0"/>
               </a:tabLst>
             </a:pPr>
-            <a:fld id="{EBC5062A-3C84-42AB-9740-DC0E46DFA155}" type="slidenum">
+            <a:fld id="{4DE1E4F9-1ED7-4D16-B6C1-CF025DCEF9BF}" type="slidenum">
               <a:rPr b="0" lang="es-CO" sz="1400" spc="-1" strike="noStrike">
                 <a:solidFill>
                   <a:srgbClr val="000000"/>
@@ -1041,7 +1041,7 @@
         <p:spPr>
           <a:xfrm>
             <a:off x="685800" y="1143000"/>
-            <a:ext cx="5484960" cy="3084840"/>
+            <a:ext cx="5484600" cy="3084480"/>
           </a:xfrm>
           <a:prstGeom prst="rect">
             <a:avLst/>
@@ -1064,7 +1064,7 @@
         <p:spPr>
           <a:xfrm>
             <a:off x="685800" y="4400640"/>
-            <a:ext cx="5484960" cy="3599280"/>
+            <a:ext cx="5484600" cy="3598920"/>
           </a:xfrm>
           <a:prstGeom prst="rect">
             <a:avLst/>
@@ -1104,7 +1104,7 @@
         <p:spPr>
           <a:xfrm>
             <a:off x="3884760" y="8685360"/>
-            <a:ext cx="2970360" cy="457200"/>
+            <a:ext cx="2970000" cy="456840"/>
           </a:xfrm>
           <a:prstGeom prst="rect">
             <a:avLst/>
@@ -1145,7 +1145,7 @@
                 <a:tab algn="l" pos="0"/>
               </a:tabLst>
             </a:pPr>
-            <a:fld id="{45C066D3-522D-4B49-A2BF-A96BCD32DC6F}" type="slidenum">
+            <a:fld id="{4A3808D9-C4A1-4DB7-B1C3-CA4B0B3C25AE}" type="slidenum">
               <a:rPr b="0" lang="es-CO" sz="1400" spc="-1" strike="noStrike">
                 <a:solidFill>
                   <a:srgbClr val="000000"/>
@@ -1198,7 +1198,7 @@
         <p:spPr>
           <a:xfrm>
             <a:off x="685800" y="1143000"/>
-            <a:ext cx="5484960" cy="3084840"/>
+            <a:ext cx="5484600" cy="3084480"/>
           </a:xfrm>
           <a:prstGeom prst="rect">
             <a:avLst/>
@@ -1221,7 +1221,7 @@
         <p:spPr>
           <a:xfrm>
             <a:off x="685800" y="4400640"/>
-            <a:ext cx="5484960" cy="3599280"/>
+            <a:ext cx="5484600" cy="3598920"/>
           </a:xfrm>
           <a:prstGeom prst="rect">
             <a:avLst/>
@@ -1261,7 +1261,7 @@
         <p:spPr>
           <a:xfrm>
             <a:off x="3884760" y="8685360"/>
-            <a:ext cx="2970360" cy="457200"/>
+            <a:ext cx="2970000" cy="456840"/>
           </a:xfrm>
           <a:prstGeom prst="rect">
             <a:avLst/>
@@ -1302,7 +1302,7 @@
                 <a:tab algn="l" pos="0"/>
               </a:tabLst>
             </a:pPr>
-            <a:fld id="{638B6E76-5804-4BF8-A011-7F27058D4225}" type="slidenum">
+            <a:fld id="{F766EEB2-31B3-470D-8B87-FCCE5F9A1B2D}" type="slidenum">
               <a:rPr b="0" lang="es-CO" sz="1400" spc="-1" strike="noStrike">
                 <a:solidFill>
                   <a:srgbClr val="000000"/>
@@ -1355,7 +1355,7 @@
         <p:spPr>
           <a:xfrm>
             <a:off x="685800" y="1143000"/>
-            <a:ext cx="5484960" cy="3084840"/>
+            <a:ext cx="5484600" cy="3084480"/>
           </a:xfrm>
           <a:prstGeom prst="rect">
             <a:avLst/>
@@ -1378,7 +1378,7 @@
         <p:spPr>
           <a:xfrm>
             <a:off x="685800" y="4400640"/>
-            <a:ext cx="5484960" cy="3599280"/>
+            <a:ext cx="5484600" cy="3598920"/>
           </a:xfrm>
           <a:prstGeom prst="rect">
             <a:avLst/>
@@ -1418,7 +1418,7 @@
         <p:spPr>
           <a:xfrm>
             <a:off x="3884760" y="8685360"/>
-            <a:ext cx="2970360" cy="457200"/>
+            <a:ext cx="2970000" cy="456840"/>
           </a:xfrm>
           <a:prstGeom prst="rect">
             <a:avLst/>
@@ -1459,7 +1459,7 @@
                 <a:tab algn="l" pos="0"/>
               </a:tabLst>
             </a:pPr>
-            <a:fld id="{385D916D-0F5A-4114-B15E-0C9678AA6317}" type="slidenum">
+            <a:fld id="{A231A367-99A3-450F-8BDF-BEF5FF99E061}" type="slidenum">
               <a:rPr b="0" lang="es-CO" sz="1400" spc="-1" strike="noStrike">
                 <a:solidFill>
                   <a:srgbClr val="000000"/>
@@ -1512,7 +1512,7 @@
         <p:spPr>
           <a:xfrm>
             <a:off x="685800" y="1143000"/>
-            <a:ext cx="5484960" cy="3084840"/>
+            <a:ext cx="5484600" cy="3084480"/>
           </a:xfrm>
           <a:prstGeom prst="rect">
             <a:avLst/>
@@ -1535,7 +1535,7 @@
         <p:spPr>
           <a:xfrm>
             <a:off x="685800" y="4400640"/>
-            <a:ext cx="5484960" cy="3599280"/>
+            <a:ext cx="5484600" cy="3598920"/>
           </a:xfrm>
           <a:prstGeom prst="rect">
             <a:avLst/>
@@ -1575,7 +1575,7 @@
         <p:spPr>
           <a:xfrm>
             <a:off x="3884760" y="8685360"/>
-            <a:ext cx="2970360" cy="457200"/>
+            <a:ext cx="2970000" cy="456840"/>
           </a:xfrm>
           <a:prstGeom prst="rect">
             <a:avLst/>
@@ -1616,7 +1616,7 @@
                 <a:tab algn="l" pos="0"/>
               </a:tabLst>
             </a:pPr>
-            <a:fld id="{6563D1D8-4724-4BD7-BE39-4AB69895B791}" type="slidenum">
+            <a:fld id="{91CAB073-CBA3-47D3-B556-9DC4A2D1C283}" type="slidenum">
               <a:rPr b="0" lang="es-CO" sz="1400" spc="-1" strike="noStrike">
                 <a:solidFill>
                   <a:srgbClr val="000000"/>
@@ -1669,7 +1669,7 @@
         <p:spPr>
           <a:xfrm>
             <a:off x="685800" y="1143000"/>
-            <a:ext cx="5484960" cy="3084840"/>
+            <a:ext cx="5484600" cy="3084480"/>
           </a:xfrm>
           <a:prstGeom prst="rect">
             <a:avLst/>
@@ -1692,7 +1692,7 @@
         <p:spPr>
           <a:xfrm>
             <a:off x="685800" y="4400640"/>
-            <a:ext cx="5484960" cy="3599280"/>
+            <a:ext cx="5484600" cy="3598920"/>
           </a:xfrm>
           <a:prstGeom prst="rect">
             <a:avLst/>
@@ -1732,7 +1732,7 @@
         <p:spPr>
           <a:xfrm>
             <a:off x="3884760" y="8685360"/>
-            <a:ext cx="2970360" cy="457200"/>
+            <a:ext cx="2970000" cy="456840"/>
           </a:xfrm>
           <a:prstGeom prst="rect">
             <a:avLst/>
@@ -1773,7 +1773,7 @@
                 <a:tab algn="l" pos="0"/>
               </a:tabLst>
             </a:pPr>
-            <a:fld id="{920D8422-AAA9-4D91-B679-ED34E9491BD3}" type="slidenum">
+            <a:fld id="{46B3D2E8-B3C4-4203-ACC1-AD554E8C1607}" type="slidenum">
               <a:rPr b="0" lang="es-CO" sz="1400" spc="-1" strike="noStrike">
                 <a:solidFill>
                   <a:srgbClr val="000000"/>
@@ -1826,7 +1826,7 @@
         <p:spPr>
           <a:xfrm>
             <a:off x="685800" y="1143000"/>
-            <a:ext cx="5484960" cy="3084840"/>
+            <a:ext cx="5484600" cy="3084480"/>
           </a:xfrm>
           <a:prstGeom prst="rect">
             <a:avLst/>
@@ -1849,7 +1849,7 @@
         <p:spPr>
           <a:xfrm>
             <a:off x="685800" y="4400640"/>
-            <a:ext cx="5484960" cy="3599280"/>
+            <a:ext cx="5484600" cy="3598920"/>
           </a:xfrm>
           <a:prstGeom prst="rect">
             <a:avLst/>
@@ -1889,7 +1889,7 @@
         <p:spPr>
           <a:xfrm>
             <a:off x="3884760" y="8685360"/>
-            <a:ext cx="2970360" cy="457200"/>
+            <a:ext cx="2970000" cy="456840"/>
           </a:xfrm>
           <a:prstGeom prst="rect">
             <a:avLst/>
@@ -1930,7 +1930,7 @@
                 <a:tab algn="l" pos="0"/>
               </a:tabLst>
             </a:pPr>
-            <a:fld id="{BCC8619E-47DB-4DE7-BF4C-B3B5E01712F6}" type="slidenum">
+            <a:fld id="{408B3181-9516-49B9-ACD7-332351EC2046}" type="slidenum">
               <a:rPr b="0" lang="es-CO" sz="1400" spc="-1" strike="noStrike">
                 <a:solidFill>
                   <a:srgbClr val="000000"/>
@@ -1983,7 +1983,7 @@
         <p:spPr>
           <a:xfrm>
             <a:off x="685800" y="1143000"/>
-            <a:ext cx="5484960" cy="3084840"/>
+            <a:ext cx="5484600" cy="3084480"/>
           </a:xfrm>
           <a:prstGeom prst="rect">
             <a:avLst/>
@@ -2006,7 +2006,7 @@
         <p:spPr>
           <a:xfrm>
             <a:off x="685800" y="4400640"/>
-            <a:ext cx="5484960" cy="3599280"/>
+            <a:ext cx="5484600" cy="3598920"/>
           </a:xfrm>
           <a:prstGeom prst="rect">
             <a:avLst/>
@@ -2046,7 +2046,7 @@
         <p:spPr>
           <a:xfrm>
             <a:off x="3884760" y="8685360"/>
-            <a:ext cx="2970360" cy="457200"/>
+            <a:ext cx="2970000" cy="456840"/>
           </a:xfrm>
           <a:prstGeom prst="rect">
             <a:avLst/>
@@ -2087,7 +2087,7 @@
                 <a:tab algn="l" pos="0"/>
               </a:tabLst>
             </a:pPr>
-            <a:fld id="{01F3139E-C85E-4D3F-A24E-05CDD9631C73}" type="slidenum">
+            <a:fld id="{B5C4B90E-C2BE-4FB7-BF6A-9CE17AFEE1B1}" type="slidenum">
               <a:rPr b="0" lang="es-CO" sz="1400" spc="-1" strike="noStrike">
                 <a:solidFill>
                   <a:srgbClr val="000000"/>
@@ -2161,7 +2161,7 @@
         <p:txBody>
           <a:bodyPr/>
           <a:p>
-            <a:fld id="{E6D4F7F5-AD95-417D-986D-ECAA8549C4BB}" type="slidenum">
+            <a:fld id="{83C786AF-B0CE-4F63-B8E7-0CF84A771A32}" type="slidenum">
               <a:t>&lt;#&gt;</a:t>
             </a:fld>
           </a:p>
@@ -2244,7 +2244,7 @@
         <p:txBody>
           <a:bodyPr/>
           <a:p>
-            <a:fld id="{F9484263-0A30-483D-AA33-860E147E4504}" type="slidenum">
+            <a:fld id="{F2DFD784-F876-446C-87D0-7A2DB4F02C45}" type="slidenum">
               <a:t>&lt;#&gt;</a:t>
             </a:fld>
           </a:p>
@@ -2327,7 +2327,7 @@
         <p:txBody>
           <a:bodyPr/>
           <a:p>
-            <a:fld id="{2BFFEF55-8E6A-4CFB-8C47-F2DFD8929A7C}" type="slidenum">
+            <a:fld id="{4F745629-77D6-49BE-8887-37F005AD7E41}" type="slidenum">
               <a:t>&lt;#&gt;</a:t>
             </a:fld>
           </a:p>
@@ -2410,7 +2410,7 @@
         <p:txBody>
           <a:bodyPr/>
           <a:p>
-            <a:fld id="{4522F38B-15A1-4918-A3E2-E5159D537CBD}" type="slidenum">
+            <a:fld id="{22814C8D-8F2D-4C66-A21E-01CC2A0119E1}" type="slidenum">
               <a:t>&lt;#&gt;</a:t>
             </a:fld>
           </a:p>
@@ -2493,7 +2493,7 @@
         <p:txBody>
           <a:bodyPr/>
           <a:p>
-            <a:fld id="{8F59D719-27E8-46A9-B143-7E5AD0567EBC}" type="slidenum">
+            <a:fld id="{73E147A8-63DD-4317-BA05-4F5825ED856A}" type="slidenum">
               <a:t>&lt;#&gt;</a:t>
             </a:fld>
           </a:p>
@@ -2656,7 +2656,7 @@
         <p:txBody>
           <a:bodyPr/>
           <a:p>
-            <a:fld id="{66826557-5187-4E35-A90B-26239C318A5E}" type="slidenum">
+            <a:fld id="{BE3C6473-EFEF-4332-8D7F-2EA3D7832C0A}" type="slidenum">
               <a:t>&lt;#&gt;</a:t>
             </a:fld>
           </a:p>
@@ -2822,7 +2822,7 @@
         <p:txBody>
           <a:bodyPr/>
           <a:p>
-            <a:fld id="{7A824EF0-1F43-486B-98D1-8A95518F0807}" type="slidenum">
+            <a:fld id="{B4391989-3D5D-4C91-A03C-E01B7E064CF3}" type="slidenum">
               <a:t>&lt;#&gt;</a:t>
             </a:fld>
           </a:p>
@@ -2905,7 +2905,7 @@
         <p:txBody>
           <a:bodyPr/>
           <a:p>
-            <a:fld id="{C7ABBB79-61FD-4BCF-9DC2-CB1287D04173}" type="slidenum">
+            <a:fld id="{6A7E1D46-7882-41F6-B2C4-C82DF717EB38}" type="slidenum">
               <a:t>&lt;#&gt;</a:t>
             </a:fld>
           </a:p>
@@ -3114,7 +3114,7 @@
         <p:txBody>
           <a:bodyPr/>
           <a:p>
-            <a:fld id="{6CEF87A2-F195-43B2-8DEE-C320C6DBD859}" type="slidenum">
+            <a:fld id="{A902C6FB-2EDA-48C3-91A7-8FAEB59E665B}" type="slidenum">
               <a:t>&lt;#&gt;</a:t>
             </a:fld>
           </a:p>
@@ -3197,7 +3197,7 @@
         <p:txBody>
           <a:bodyPr/>
           <a:p>
-            <a:fld id="{C844E19B-0FFF-4323-AA99-6F163B699BB9}" type="slidenum">
+            <a:fld id="{292DD9A0-A502-4D96-99AF-F2537A28A682}" type="slidenum">
               <a:t>&lt;#&gt;</a:t>
             </a:fld>
           </a:p>
@@ -3320,7 +3320,7 @@
         <p:txBody>
           <a:bodyPr/>
           <a:p>
-            <a:fld id="{A9DE8E18-5346-460C-94A2-281F567A439B}" type="slidenum">
+            <a:fld id="{073E1612-69FF-4C10-9352-BB792A32D282}" type="slidenum">
               <a:t>&lt;#&gt;</a:t>
             </a:fld>
           </a:p>
@@ -3389,7 +3389,7 @@
         <p:spPr>
           <a:xfrm>
             <a:off x="4038480" y="6356520"/>
-            <a:ext cx="4113360" cy="363600"/>
+            <a:ext cx="4113000" cy="363240"/>
           </a:xfrm>
           <a:prstGeom prst="rect">
             <a:avLst/>
@@ -3461,7 +3461,7 @@
         <p:spPr>
           <a:xfrm>
             <a:off x="8610480" y="6356520"/>
-            <a:ext cx="2741760" cy="363600"/>
+            <a:ext cx="2741400" cy="363240"/>
           </a:xfrm>
           <a:prstGeom prst="rect">
             <a:avLst/>
@@ -3503,7 +3503,7 @@
                 <a:tab algn="l" pos="0"/>
               </a:tabLst>
             </a:pPr>
-            <a:fld id="{3F09253F-044A-4A88-80F1-4430D359727C}" type="slidenum">
+            <a:fld id="{5621D047-A53D-4EB3-8603-D25EDCD0E961}" type="slidenum">
               <a:rPr b="0" lang="es-CO" sz="1200" spc="-1" strike="noStrike">
                 <a:solidFill>
                   <a:srgbClr val="888888"/>
@@ -3535,7 +3535,7 @@
         <p:spPr>
           <a:xfrm>
             <a:off x="838080" y="6356520"/>
-            <a:ext cx="2741760" cy="363600"/>
+            <a:ext cx="2741400" cy="363240"/>
           </a:xfrm>
           <a:prstGeom prst="rect">
             <a:avLst/>
@@ -3902,7 +3902,7 @@
         <p:spPr>
           <a:xfrm>
             <a:off x="4038480" y="6356520"/>
-            <a:ext cx="4113360" cy="363600"/>
+            <a:ext cx="4113000" cy="363240"/>
           </a:xfrm>
           <a:prstGeom prst="rect">
             <a:avLst/>
@@ -3974,7 +3974,7 @@
         <p:spPr>
           <a:xfrm>
             <a:off x="8610480" y="6356520"/>
-            <a:ext cx="2741760" cy="363600"/>
+            <a:ext cx="2741400" cy="363240"/>
           </a:xfrm>
           <a:prstGeom prst="rect">
             <a:avLst/>
@@ -4016,7 +4016,7 @@
                 <a:tab algn="l" pos="0"/>
               </a:tabLst>
             </a:pPr>
-            <a:fld id="{2126FF0B-883C-43E7-A10A-1D63CA7A063C}" type="slidenum">
+            <a:fld id="{A74C6A4A-3083-433B-B29E-6DAE7740DF09}" type="slidenum">
               <a:rPr b="0" lang="es-CO" sz="1200" spc="-1" strike="noStrike">
                 <a:solidFill>
                   <a:srgbClr val="888888"/>
@@ -4048,7 +4048,7 @@
         <p:spPr>
           <a:xfrm>
             <a:off x="838080" y="6356520"/>
-            <a:ext cx="2741760" cy="363600"/>
+            <a:ext cx="2741400" cy="363240"/>
           </a:xfrm>
           <a:prstGeom prst="rect">
             <a:avLst/>
@@ -4141,7 +4141,7 @@
         <p:spPr>
           <a:xfrm>
             <a:off x="4038480" y="6356520"/>
-            <a:ext cx="4113360" cy="363600"/>
+            <a:ext cx="4113000" cy="363240"/>
           </a:xfrm>
           <a:prstGeom prst="rect">
             <a:avLst/>
@@ -4213,7 +4213,7 @@
         <p:spPr>
           <a:xfrm>
             <a:off x="8610480" y="6356520"/>
-            <a:ext cx="2741760" cy="363600"/>
+            <a:ext cx="2741400" cy="363240"/>
           </a:xfrm>
           <a:prstGeom prst="rect">
             <a:avLst/>
@@ -4255,7 +4255,7 @@
                 <a:tab algn="l" pos="0"/>
               </a:tabLst>
             </a:pPr>
-            <a:fld id="{3373264E-570B-48A2-810A-A9FA63E8FB3C}" type="slidenum">
+            <a:fld id="{8EBBC1DB-63E1-43C5-B0F6-157F41784429}" type="slidenum">
               <a:rPr b="0" lang="es-CO" sz="1200" spc="-1" strike="noStrike">
                 <a:solidFill>
                   <a:srgbClr val="888888"/>
@@ -4287,7 +4287,7 @@
         <p:spPr>
           <a:xfrm>
             <a:off x="838080" y="6356520"/>
-            <a:ext cx="2741760" cy="363600"/>
+            <a:ext cx="2741400" cy="363240"/>
           </a:xfrm>
           <a:prstGeom prst="rect">
             <a:avLst/>
@@ -4380,7 +4380,7 @@
         <p:spPr>
           <a:xfrm>
             <a:off x="4038480" y="6356520"/>
-            <a:ext cx="4113360" cy="363600"/>
+            <a:ext cx="4113000" cy="363240"/>
           </a:xfrm>
           <a:prstGeom prst="rect">
             <a:avLst/>
@@ -4452,7 +4452,7 @@
         <p:spPr>
           <a:xfrm>
             <a:off x="8610480" y="6356520"/>
-            <a:ext cx="2741760" cy="363600"/>
+            <a:ext cx="2741400" cy="363240"/>
           </a:xfrm>
           <a:prstGeom prst="rect">
             <a:avLst/>
@@ -4494,7 +4494,7 @@
                 <a:tab algn="l" pos="0"/>
               </a:tabLst>
             </a:pPr>
-            <a:fld id="{843AC1B4-C343-47B6-995D-01228E07AA4F}" type="slidenum">
+            <a:fld id="{AD21825F-DA4F-4AB2-BC69-C9F927417C3A}" type="slidenum">
               <a:rPr b="0" lang="es-CO" sz="1200" spc="-1" strike="noStrike">
                 <a:solidFill>
                   <a:srgbClr val="888888"/>
@@ -4526,7 +4526,7 @@
         <p:spPr>
           <a:xfrm>
             <a:off x="838080" y="6356520"/>
-            <a:ext cx="2741760" cy="363600"/>
+            <a:ext cx="2741400" cy="363240"/>
           </a:xfrm>
           <a:prstGeom prst="rect">
             <a:avLst/>
@@ -4619,7 +4619,7 @@
         <p:spPr>
           <a:xfrm>
             <a:off x="4038480" y="6356520"/>
-            <a:ext cx="4113360" cy="363600"/>
+            <a:ext cx="4113000" cy="363240"/>
           </a:xfrm>
           <a:prstGeom prst="rect">
             <a:avLst/>
@@ -4691,7 +4691,7 @@
         <p:spPr>
           <a:xfrm>
             <a:off x="8610480" y="6356520"/>
-            <a:ext cx="2741760" cy="363600"/>
+            <a:ext cx="2741400" cy="363240"/>
           </a:xfrm>
           <a:prstGeom prst="rect">
             <a:avLst/>
@@ -4733,7 +4733,7 @@
                 <a:tab algn="l" pos="0"/>
               </a:tabLst>
             </a:pPr>
-            <a:fld id="{F5C39CE2-F7E0-4FD0-9CE3-99B3136C6C5E}" type="slidenum">
+            <a:fld id="{C0A36DBE-0BA6-44AD-84E7-FA1BC5CBFDF7}" type="slidenum">
               <a:rPr b="0" lang="es-CO" sz="1200" spc="-1" strike="noStrike">
                 <a:solidFill>
                   <a:srgbClr val="888888"/>
@@ -4765,7 +4765,7 @@
         <p:spPr>
           <a:xfrm>
             <a:off x="838080" y="6356520"/>
-            <a:ext cx="2741760" cy="363600"/>
+            <a:ext cx="2741400" cy="363240"/>
           </a:xfrm>
           <a:prstGeom prst="rect">
             <a:avLst/>
@@ -4907,7 +4907,7 @@
         <p:spPr>
           <a:xfrm>
             <a:off x="4038480" y="6356520"/>
-            <a:ext cx="4113360" cy="363600"/>
+            <a:ext cx="4113000" cy="363240"/>
           </a:xfrm>
           <a:prstGeom prst="rect">
             <a:avLst/>
@@ -4979,7 +4979,7 @@
         <p:spPr>
           <a:xfrm>
             <a:off x="8610480" y="6356520"/>
-            <a:ext cx="2741760" cy="363600"/>
+            <a:ext cx="2741400" cy="363240"/>
           </a:xfrm>
           <a:prstGeom prst="rect">
             <a:avLst/>
@@ -5021,7 +5021,7 @@
                 <a:tab algn="l" pos="0"/>
               </a:tabLst>
             </a:pPr>
-            <a:fld id="{284B1F1F-DB5A-4443-96CB-0A8300AFE498}" type="slidenum">
+            <a:fld id="{20BEE45D-380A-4A6B-9B57-030B7F061053}" type="slidenum">
               <a:rPr b="0" lang="es-CO" sz="1200" spc="-1" strike="noStrike">
                 <a:solidFill>
                   <a:srgbClr val="888888"/>
@@ -5053,7 +5053,7 @@
         <p:spPr>
           <a:xfrm>
             <a:off x="838080" y="6356520"/>
-            <a:ext cx="2741760" cy="363600"/>
+            <a:ext cx="2741400" cy="363240"/>
           </a:xfrm>
           <a:prstGeom prst="rect">
             <a:avLst/>
@@ -5420,7 +5420,7 @@
         <p:spPr>
           <a:xfrm>
             <a:off x="4038480" y="6356520"/>
-            <a:ext cx="4113360" cy="363600"/>
+            <a:ext cx="4113000" cy="363240"/>
           </a:xfrm>
           <a:prstGeom prst="rect">
             <a:avLst/>
@@ -5492,7 +5492,7 @@
         <p:spPr>
           <a:xfrm>
             <a:off x="8610480" y="6356520"/>
-            <a:ext cx="2741760" cy="363600"/>
+            <a:ext cx="2741400" cy="363240"/>
           </a:xfrm>
           <a:prstGeom prst="rect">
             <a:avLst/>
@@ -5534,7 +5534,7 @@
                 <a:tab algn="l" pos="0"/>
               </a:tabLst>
             </a:pPr>
-            <a:fld id="{5B4B7DCE-BFE0-4059-BBDB-6DDD4E441281}" type="slidenum">
+            <a:fld id="{8C6E0DC3-6F07-4A5E-9932-D6F09B87836C}" type="slidenum">
               <a:rPr b="0" lang="es-CO" sz="1200" spc="-1" strike="noStrike">
                 <a:solidFill>
                   <a:srgbClr val="888888"/>
@@ -5566,7 +5566,7 @@
         <p:spPr>
           <a:xfrm>
             <a:off x="838080" y="6356520"/>
-            <a:ext cx="2741760" cy="363600"/>
+            <a:ext cx="2741400" cy="363240"/>
           </a:xfrm>
           <a:prstGeom prst="rect">
             <a:avLst/>
@@ -5659,7 +5659,7 @@
         <p:spPr>
           <a:xfrm>
             <a:off x="4038480" y="6356520"/>
-            <a:ext cx="4113360" cy="363600"/>
+            <a:ext cx="4113000" cy="363240"/>
           </a:xfrm>
           <a:prstGeom prst="rect">
             <a:avLst/>
@@ -5731,7 +5731,7 @@
         <p:spPr>
           <a:xfrm>
             <a:off x="8610480" y="6356520"/>
-            <a:ext cx="2741760" cy="363600"/>
+            <a:ext cx="2741400" cy="363240"/>
           </a:xfrm>
           <a:prstGeom prst="rect">
             <a:avLst/>
@@ -5773,7 +5773,7 @@
                 <a:tab algn="l" pos="0"/>
               </a:tabLst>
             </a:pPr>
-            <a:fld id="{562D8138-3051-4790-93B5-ED15263716C7}" type="slidenum">
+            <a:fld id="{9120225D-0DF2-4B46-810E-F10E452EC2FB}" type="slidenum">
               <a:rPr b="0" lang="es-CO" sz="1200" spc="-1" strike="noStrike">
                 <a:solidFill>
                   <a:srgbClr val="888888"/>
@@ -5805,7 +5805,7 @@
         <p:spPr>
           <a:xfrm>
             <a:off x="838080" y="6356520"/>
-            <a:ext cx="2741760" cy="363600"/>
+            <a:ext cx="2741400" cy="363240"/>
           </a:xfrm>
           <a:prstGeom prst="rect">
             <a:avLst/>
@@ -6397,7 +6397,7 @@
         <p:spPr>
           <a:xfrm>
             <a:off x="4038480" y="6356520"/>
-            <a:ext cx="4113360" cy="363600"/>
+            <a:ext cx="4113000" cy="363240"/>
           </a:xfrm>
           <a:prstGeom prst="rect">
             <a:avLst/>
@@ -6469,7 +6469,7 @@
         <p:spPr>
           <a:xfrm>
             <a:off x="8610480" y="6356520"/>
-            <a:ext cx="2741760" cy="363600"/>
+            <a:ext cx="2741400" cy="363240"/>
           </a:xfrm>
           <a:prstGeom prst="rect">
             <a:avLst/>
@@ -6511,7 +6511,7 @@
                 <a:tab algn="l" pos="0"/>
               </a:tabLst>
             </a:pPr>
-            <a:fld id="{D3784175-1793-4D9C-B645-C0635B524B16}" type="slidenum">
+            <a:fld id="{2B4BB177-3804-404D-A41A-5BBD30DDFF64}" type="slidenum">
               <a:rPr b="0" lang="es-CO" sz="1200" spc="-1" strike="noStrike">
                 <a:solidFill>
                   <a:srgbClr val="888888"/>
@@ -6543,7 +6543,7 @@
         <p:spPr>
           <a:xfrm>
             <a:off x="838080" y="6356520"/>
-            <a:ext cx="2741760" cy="363600"/>
+            <a:ext cx="2741400" cy="363240"/>
           </a:xfrm>
           <a:prstGeom prst="rect">
             <a:avLst/>
@@ -6636,7 +6636,7 @@
         <p:spPr>
           <a:xfrm>
             <a:off x="4038480" y="6356520"/>
-            <a:ext cx="4113360" cy="363600"/>
+            <a:ext cx="4113000" cy="363240"/>
           </a:xfrm>
           <a:prstGeom prst="rect">
             <a:avLst/>
@@ -6708,7 +6708,7 @@
         <p:spPr>
           <a:xfrm>
             <a:off x="8610480" y="6356520"/>
-            <a:ext cx="2741760" cy="363600"/>
+            <a:ext cx="2741400" cy="363240"/>
           </a:xfrm>
           <a:prstGeom prst="rect">
             <a:avLst/>
@@ -6750,7 +6750,7 @@
                 <a:tab algn="l" pos="0"/>
               </a:tabLst>
             </a:pPr>
-            <a:fld id="{C87DD431-88F7-4744-B871-3D8F334F7C79}" type="slidenum">
+            <a:fld id="{EAB96A8E-6589-49F4-9E08-BB0D7EE845A6}" type="slidenum">
               <a:rPr b="0" lang="es-CO" sz="1200" spc="-1" strike="noStrike">
                 <a:solidFill>
                   <a:srgbClr val="888888"/>
@@ -6782,7 +6782,7 @@
         <p:spPr>
           <a:xfrm>
             <a:off x="838080" y="6356520"/>
-            <a:ext cx="2741760" cy="363600"/>
+            <a:ext cx="2741400" cy="363240"/>
           </a:xfrm>
           <a:prstGeom prst="rect">
             <a:avLst/>
@@ -6924,7 +6924,7 @@
         <p:spPr>
           <a:xfrm>
             <a:off x="4038480" y="6356520"/>
-            <a:ext cx="4113360" cy="363600"/>
+            <a:ext cx="4113000" cy="363240"/>
           </a:xfrm>
           <a:prstGeom prst="rect">
             <a:avLst/>
@@ -6996,7 +6996,7 @@
         <p:spPr>
           <a:xfrm>
             <a:off x="8610480" y="6356520"/>
-            <a:ext cx="2741760" cy="363600"/>
+            <a:ext cx="2741400" cy="363240"/>
           </a:xfrm>
           <a:prstGeom prst="rect">
             <a:avLst/>
@@ -7038,7 +7038,7 @@
                 <a:tab algn="l" pos="0"/>
               </a:tabLst>
             </a:pPr>
-            <a:fld id="{5E8EC603-4FD9-406D-96C1-5F88623E185B}" type="slidenum">
+            <a:fld id="{0E16708B-CE25-4305-8165-3F3FF085D8F5}" type="slidenum">
               <a:rPr b="0" lang="es-CO" sz="1200" spc="-1" strike="noStrike">
                 <a:solidFill>
                   <a:srgbClr val="888888"/>
@@ -7070,7 +7070,7 @@
         <p:spPr>
           <a:xfrm>
             <a:off x="838080" y="6356520"/>
-            <a:ext cx="2741760" cy="363600"/>
+            <a:ext cx="2741400" cy="363240"/>
           </a:xfrm>
           <a:prstGeom prst="rect">
             <a:avLst/>
@@ -7152,9 +7152,9 @@
         <p:grpSpPr>
           <a:xfrm>
             <a:off x="0" y="0"/>
-            <a:ext cx="12190680" cy="6856560"/>
+            <a:ext cx="12190320" cy="6856200"/>
             <a:chOff x="0" y="0"/>
-            <a:chExt cx="12190680" cy="6856560"/>
+            <a:chExt cx="12190320" cy="6856200"/>
           </a:xfrm>
         </p:grpSpPr>
         <p:pic>
@@ -7171,7 +7171,7 @@
           <p:spPr>
             <a:xfrm>
               <a:off x="0" y="0"/>
-              <a:ext cx="12190680" cy="6856560"/>
+              <a:ext cx="12190320" cy="6856200"/>
             </a:xfrm>
             <a:prstGeom prst="rect">
               <a:avLst/>
@@ -7194,7 +7194,7 @@
           <p:spPr>
             <a:xfrm>
               <a:off x="0" y="0"/>
-              <a:ext cx="12190680" cy="6856560"/>
+              <a:ext cx="12190320" cy="6856200"/>
             </a:xfrm>
             <a:prstGeom prst="rect">
               <a:avLst/>
@@ -7218,7 +7218,7 @@
         <p:spPr>
           <a:xfrm>
             <a:off x="4219200" y="647640"/>
-            <a:ext cx="3752640" cy="1797480"/>
+            <a:ext cx="3752280" cy="1797120"/>
           </a:xfrm>
           <a:prstGeom prst="rect">
             <a:avLst/>
@@ -7237,7 +7237,7 @@
         <p:spPr>
           <a:xfrm>
             <a:off x="2158560" y="2392560"/>
-            <a:ext cx="7873200" cy="1156320"/>
+            <a:ext cx="7872840" cy="1156320"/>
           </a:xfrm>
           <a:prstGeom prst="rect">
             <a:avLst/>
@@ -7294,7 +7294,7 @@
         <p:spPr>
           <a:xfrm>
             <a:off x="2185200" y="3582000"/>
-            <a:ext cx="7873200" cy="699120"/>
+            <a:ext cx="7872840" cy="699120"/>
           </a:xfrm>
           <a:prstGeom prst="rect">
             <a:avLst/>
@@ -7365,7 +7365,7 @@
         <p:spPr>
           <a:xfrm>
             <a:off x="9712800" y="5933520"/>
-            <a:ext cx="2163600" cy="668160"/>
+            <a:ext cx="2163240" cy="667800"/>
           </a:xfrm>
           <a:prstGeom prst="rect">
             <a:avLst/>
@@ -7384,9 +7384,9 @@
         <p:grpSpPr>
           <a:xfrm>
             <a:off x="626400" y="254520"/>
-            <a:ext cx="11250000" cy="981720"/>
+            <a:ext cx="11249640" cy="981360"/>
             <a:chOff x="626400" y="254520"/>
-            <a:chExt cx="11250000" cy="981720"/>
+            <a:chExt cx="11249640" cy="981360"/>
           </a:xfrm>
         </p:grpSpPr>
         <p:pic>
@@ -7402,7 +7402,7 @@
           <p:spPr>
             <a:xfrm>
               <a:off x="10059840" y="254520"/>
-              <a:ext cx="1816560" cy="981720"/>
+              <a:ext cx="1816200" cy="981360"/>
             </a:xfrm>
             <a:prstGeom prst="rect">
               <a:avLst/>
@@ -7425,7 +7425,7 @@
           <p:spPr>
             <a:xfrm>
               <a:off x="626400" y="484200"/>
-              <a:ext cx="1504440" cy="523080"/>
+              <a:ext cx="1504080" cy="522720"/>
             </a:xfrm>
             <a:prstGeom prst="rect">
               <a:avLst/>
@@ -7445,7 +7445,7 @@
         <p:spPr>
           <a:xfrm>
             <a:off x="4545360" y="4447800"/>
-            <a:ext cx="2818440" cy="921960"/>
+            <a:ext cx="2818080" cy="921600"/>
           </a:xfrm>
           <a:prstGeom prst="rect">
             <a:avLst/>
@@ -7534,7 +7534,7 @@
                 <a:latin typeface="Arial"/>
                 <a:ea typeface="Arial"/>
               </a:rPr>
-              <a:t>24/06/2024</a:t>
+              <a:t>09/07/2024</a:t>
             </a:r>
             <a:endParaRPr b="0" lang="es-CO" sz="1800" spc="-1" strike="noStrike">
               <a:solidFill>
@@ -7588,7 +7588,7 @@
         <p:spPr>
           <a:xfrm>
             <a:off x="3965040" y="4641120"/>
-            <a:ext cx="4088520" cy="1335960"/>
+            <a:ext cx="4088160" cy="1335600"/>
           </a:xfrm>
           <a:prstGeom prst="rect">
             <a:avLst/>
@@ -7607,7 +7607,7 @@
         <p:spPr>
           <a:xfrm>
             <a:off x="1228680" y="585000"/>
-            <a:ext cx="9565200" cy="1186920"/>
+            <a:ext cx="9564840" cy="1186920"/>
           </a:xfrm>
           <a:prstGeom prst="rect">
             <a:avLst/>
@@ -7669,7 +7669,7 @@
         <p:spPr>
           <a:xfrm>
             <a:off x="4869360" y="2808000"/>
-            <a:ext cx="2451600" cy="870120"/>
+            <a:ext cx="2451240" cy="869760"/>
           </a:xfrm>
           <a:prstGeom prst="rect">
             <a:avLst/>
@@ -7692,7 +7692,7 @@
         <p:spPr>
           <a:xfrm>
             <a:off x="1228680" y="2808000"/>
-            <a:ext cx="1853640" cy="645120"/>
+            <a:ext cx="1853280" cy="644760"/>
           </a:xfrm>
           <a:prstGeom prst="rect">
             <a:avLst/>
@@ -7715,7 +7715,7 @@
         <p:spPr>
           <a:xfrm>
             <a:off x="8579880" y="2695680"/>
-            <a:ext cx="2026080" cy="1095120"/>
+            <a:ext cx="2025720" cy="1094760"/>
           </a:xfrm>
           <a:prstGeom prst="rect">
             <a:avLst/>
@@ -7738,7 +7738,7 @@
         <p:spPr>
           <a:xfrm>
             <a:off x="597600" y="398520"/>
-            <a:ext cx="1086480" cy="378000"/>
+            <a:ext cx="1086120" cy="377640"/>
           </a:xfrm>
           <a:prstGeom prst="rect">
             <a:avLst/>
@@ -7761,7 +7761,7 @@
         <p:spPr>
           <a:xfrm>
             <a:off x="10002240" y="199800"/>
-            <a:ext cx="1422720" cy="768600"/>
+            <a:ext cx="1422360" cy="768240"/>
           </a:xfrm>
           <a:prstGeom prst="rect">
             <a:avLst/>
@@ -7810,9 +7810,9 @@
         <p:grpSpPr>
           <a:xfrm>
             <a:off x="0" y="0"/>
-            <a:ext cx="12190680" cy="6856560"/>
+            <a:ext cx="12190320" cy="6856200"/>
             <a:chOff x="0" y="0"/>
-            <a:chExt cx="12190680" cy="6856560"/>
+            <a:chExt cx="12190320" cy="6856200"/>
           </a:xfrm>
         </p:grpSpPr>
         <p:pic>
@@ -7829,7 +7829,7 @@
           <p:spPr>
             <a:xfrm>
               <a:off x="0" y="0"/>
-              <a:ext cx="12190680" cy="6856560"/>
+              <a:ext cx="12190320" cy="6856200"/>
             </a:xfrm>
             <a:prstGeom prst="rect">
               <a:avLst/>
@@ -7852,7 +7852,7 @@
           <p:spPr>
             <a:xfrm>
               <a:off x="0" y="0"/>
-              <a:ext cx="12190680" cy="6856560"/>
+              <a:ext cx="12190320" cy="6856200"/>
             </a:xfrm>
             <a:prstGeom prst="rect">
               <a:avLst/>
@@ -7876,7 +7876,7 @@
         <p:spPr>
           <a:xfrm>
             <a:off x="2340720" y="1970640"/>
-            <a:ext cx="7509600" cy="2914920"/>
+            <a:ext cx="7509240" cy="2914560"/>
           </a:xfrm>
           <a:prstGeom prst="rect">
             <a:avLst/>
@@ -7899,7 +7899,7 @@
         <p:spPr>
           <a:xfrm>
             <a:off x="4592160" y="324000"/>
-            <a:ext cx="3006000" cy="1439640"/>
+            <a:ext cx="3005640" cy="1439280"/>
           </a:xfrm>
           <a:prstGeom prst="rect">
             <a:avLst/>
@@ -7922,7 +7922,7 @@
         <p:spPr>
           <a:xfrm>
             <a:off x="9712800" y="5933520"/>
-            <a:ext cx="2163600" cy="668160"/>
+            <a:ext cx="2163240" cy="667800"/>
           </a:xfrm>
           <a:prstGeom prst="rect">
             <a:avLst/>
@@ -7941,9 +7941,9 @@
         <p:grpSpPr>
           <a:xfrm>
             <a:off x="626400" y="254520"/>
-            <a:ext cx="11250000" cy="981720"/>
+            <a:ext cx="11249640" cy="981360"/>
             <a:chOff x="626400" y="254520"/>
-            <a:chExt cx="11250000" cy="981720"/>
+            <a:chExt cx="11249640" cy="981360"/>
           </a:xfrm>
         </p:grpSpPr>
         <p:pic>
@@ -7959,7 +7959,7 @@
           <p:spPr>
             <a:xfrm>
               <a:off x="10059840" y="254520"/>
-              <a:ext cx="1816560" cy="981720"/>
+              <a:ext cx="1816200" cy="981360"/>
             </a:xfrm>
             <a:prstGeom prst="rect">
               <a:avLst/>
@@ -7982,7 +7982,7 @@
           <p:spPr>
             <a:xfrm>
               <a:off x="626400" y="484200"/>
-              <a:ext cx="1504440" cy="523080"/>
+              <a:ext cx="1504080" cy="522720"/>
             </a:xfrm>
             <a:prstGeom prst="rect">
               <a:avLst/>
@@ -8032,9 +8032,9 @@
         <p:grpSpPr>
           <a:xfrm>
             <a:off x="0" y="0"/>
-            <a:ext cx="12190680" cy="6856560"/>
+            <a:ext cx="12190320" cy="6856200"/>
             <a:chOff x="0" y="0"/>
-            <a:chExt cx="12190680" cy="6856560"/>
+            <a:chExt cx="12190320" cy="6856200"/>
           </a:xfrm>
         </p:grpSpPr>
         <p:pic>
@@ -8051,7 +8051,7 @@
           <p:spPr>
             <a:xfrm>
               <a:off x="0" y="0"/>
-              <a:ext cx="12190680" cy="6856560"/>
+              <a:ext cx="12190320" cy="6856200"/>
             </a:xfrm>
             <a:prstGeom prst="rect">
               <a:avLst/>
@@ -8074,7 +8074,7 @@
           <p:spPr>
             <a:xfrm>
               <a:off x="0" y="0"/>
-              <a:ext cx="12190680" cy="6856560"/>
+              <a:ext cx="12190320" cy="6856200"/>
             </a:xfrm>
             <a:prstGeom prst="rect">
               <a:avLst/>
@@ -8098,7 +8098,7 @@
         <p:spPr>
           <a:xfrm>
             <a:off x="4815360" y="165600"/>
-            <a:ext cx="2337840" cy="1119240"/>
+            <a:ext cx="2337480" cy="1118880"/>
           </a:xfrm>
           <a:prstGeom prst="rect">
             <a:avLst/>
@@ -8117,7 +8117,7 @@
         <p:spPr>
           <a:xfrm>
             <a:off x="2753640" y="1352160"/>
-            <a:ext cx="7105680" cy="851760"/>
+            <a:ext cx="7105320" cy="851760"/>
           </a:xfrm>
           <a:prstGeom prst="rect">
             <a:avLst/>
@@ -8174,7 +8174,7 @@
         <p:spPr>
           <a:xfrm>
             <a:off x="3476160" y="2461320"/>
-            <a:ext cx="788760" cy="788760"/>
+            <a:ext cx="788400" cy="788400"/>
           </a:xfrm>
           <a:prstGeom prst="ellipse">
             <a:avLst/>
@@ -8226,7 +8226,7 @@
         <p:spPr>
           <a:xfrm>
             <a:off x="3476160" y="3603960"/>
-            <a:ext cx="788760" cy="788760"/>
+            <a:ext cx="788400" cy="788400"/>
           </a:xfrm>
           <a:prstGeom prst="ellipse">
             <a:avLst/>
@@ -8278,7 +8278,7 @@
         <p:spPr>
           <a:xfrm>
             <a:off x="3476160" y="4757760"/>
-            <a:ext cx="788760" cy="788760"/>
+            <a:ext cx="788400" cy="788400"/>
           </a:xfrm>
           <a:prstGeom prst="ellipse">
             <a:avLst/>
@@ -8330,7 +8330,7 @@
         <p:spPr>
           <a:xfrm>
             <a:off x="4630320" y="2580840"/>
-            <a:ext cx="4189680" cy="659160"/>
+            <a:ext cx="4189320" cy="658800"/>
           </a:xfrm>
           <a:prstGeom prst="roundRect">
             <a:avLst>
@@ -8384,7 +8384,7 @@
         <p:spPr>
           <a:xfrm>
             <a:off x="4630320" y="3668760"/>
-            <a:ext cx="4189680" cy="659160"/>
+            <a:ext cx="4189320" cy="658800"/>
           </a:xfrm>
           <a:prstGeom prst="roundRect">
             <a:avLst>
@@ -8438,7 +8438,7 @@
         <p:spPr>
           <a:xfrm>
             <a:off x="4630320" y="4822560"/>
-            <a:ext cx="4189680" cy="659160"/>
+            <a:ext cx="4189320" cy="658800"/>
           </a:xfrm>
           <a:prstGeom prst="roundRect">
             <a:avLst>
@@ -8492,7 +8492,7 @@
         <p:spPr>
           <a:xfrm>
             <a:off x="3587040" y="2520000"/>
-            <a:ext cx="585360" cy="699120"/>
+            <a:ext cx="585000" cy="699120"/>
           </a:xfrm>
           <a:prstGeom prst="rect">
             <a:avLst/>
@@ -8549,7 +8549,7 @@
         <p:spPr>
           <a:xfrm>
             <a:off x="3594960" y="3687480"/>
-            <a:ext cx="585360" cy="699120"/>
+            <a:ext cx="585000" cy="699120"/>
           </a:xfrm>
           <a:prstGeom prst="rect">
             <a:avLst/>
@@ -8606,7 +8606,7 @@
         <p:spPr>
           <a:xfrm>
             <a:off x="3578040" y="4822560"/>
-            <a:ext cx="585360" cy="699120"/>
+            <a:ext cx="585000" cy="699120"/>
           </a:xfrm>
           <a:prstGeom prst="rect">
             <a:avLst/>
@@ -8663,7 +8663,7 @@
         <p:spPr>
           <a:xfrm>
             <a:off x="4815360" y="2582640"/>
-            <a:ext cx="3793680" cy="699120"/>
+            <a:ext cx="3793320" cy="699120"/>
           </a:xfrm>
           <a:prstGeom prst="rect">
             <a:avLst/>
@@ -8720,7 +8720,7 @@
         <p:spPr>
           <a:xfrm>
             <a:off x="4828320" y="3687480"/>
-            <a:ext cx="3793680" cy="577080"/>
+            <a:ext cx="3793320" cy="1065240"/>
           </a:xfrm>
           <a:prstGeom prst="rect">
             <a:avLst/>
@@ -8777,7 +8777,7 @@
         <p:spPr>
           <a:xfrm>
             <a:off x="4862520" y="4844880"/>
-            <a:ext cx="3793680" cy="515880"/>
+            <a:ext cx="3793320" cy="516600"/>
           </a:xfrm>
           <a:prstGeom prst="rect">
             <a:avLst/>
@@ -8842,8 +8842,8 @@
         </p:nvCxnSpPr>
         <p:spPr>
           <a:xfrm>
-            <a:off x="3870720" y="3250080"/>
-            <a:ext cx="360" cy="354240"/>
+            <a:off x="3870360" y="3249720"/>
+            <a:ext cx="360" cy="354600"/>
           </a:xfrm>
           <a:prstGeom prst="straightConnector1">
             <a:avLst/>
@@ -8866,8 +8866,8 @@
         </p:nvCxnSpPr>
         <p:spPr>
           <a:xfrm>
-            <a:off x="3887640" y="4386600"/>
-            <a:ext cx="2160" cy="354960"/>
+            <a:off x="3887280" y="4386600"/>
+            <a:ext cx="2880" cy="355320"/>
           </a:xfrm>
           <a:prstGeom prst="straightConnector1">
             <a:avLst/>
@@ -8889,9 +8889,9 @@
         <p:grpSpPr>
           <a:xfrm>
             <a:off x="626400" y="254520"/>
-            <a:ext cx="11250000" cy="981720"/>
+            <a:ext cx="11249640" cy="981360"/>
             <a:chOff x="626400" y="254520"/>
-            <a:chExt cx="11250000" cy="981720"/>
+            <a:chExt cx="11249640" cy="981360"/>
           </a:xfrm>
         </p:grpSpPr>
         <p:pic>
@@ -8907,7 +8907,7 @@
           <p:spPr>
             <a:xfrm>
               <a:off x="10059840" y="254520"/>
-              <a:ext cx="1816560" cy="981720"/>
+              <a:ext cx="1816200" cy="981360"/>
             </a:xfrm>
             <a:prstGeom prst="rect">
               <a:avLst/>
@@ -8930,7 +8930,7 @@
           <p:spPr>
             <a:xfrm>
               <a:off x="626400" y="484200"/>
-              <a:ext cx="1504440" cy="523080"/>
+              <a:ext cx="1504080" cy="522720"/>
             </a:xfrm>
             <a:prstGeom prst="rect">
               <a:avLst/>
@@ -8980,9 +8980,9 @@
         <p:grpSpPr>
           <a:xfrm>
             <a:off x="360" y="-17640"/>
-            <a:ext cx="12190680" cy="6856560"/>
+            <a:ext cx="12190320" cy="6856200"/>
             <a:chOff x="360" y="-17640"/>
-            <a:chExt cx="12190680" cy="6856560"/>
+            <a:chExt cx="12190320" cy="6856200"/>
           </a:xfrm>
         </p:grpSpPr>
         <p:pic>
@@ -8999,7 +8999,7 @@
           <p:spPr>
             <a:xfrm>
               <a:off x="360" y="-17640"/>
-              <a:ext cx="12190680" cy="6856560"/>
+              <a:ext cx="12190320" cy="6856200"/>
             </a:xfrm>
             <a:prstGeom prst="rect">
               <a:avLst/>
@@ -9022,7 +9022,7 @@
           <p:spPr>
             <a:xfrm>
               <a:off x="360" y="-17640"/>
-              <a:ext cx="12190680" cy="6856560"/>
+              <a:ext cx="12190320" cy="6856200"/>
             </a:xfrm>
             <a:prstGeom prst="rect">
               <a:avLst/>
@@ -9046,7 +9046,7 @@
         <p:spPr>
           <a:xfrm>
             <a:off x="4815360" y="165600"/>
-            <a:ext cx="2337840" cy="1119240"/>
+            <a:ext cx="2337480" cy="1118880"/>
           </a:xfrm>
           <a:prstGeom prst="rect">
             <a:avLst/>
@@ -9065,9 +9065,9 @@
         <p:grpSpPr>
           <a:xfrm>
             <a:off x="626400" y="254520"/>
-            <a:ext cx="11250000" cy="981720"/>
+            <a:ext cx="11249640" cy="981360"/>
             <a:chOff x="626400" y="254520"/>
-            <a:chExt cx="11250000" cy="981720"/>
+            <a:chExt cx="11249640" cy="981360"/>
           </a:xfrm>
         </p:grpSpPr>
         <p:pic>
@@ -9083,7 +9083,7 @@
           <p:spPr>
             <a:xfrm>
               <a:off x="10059840" y="254520"/>
-              <a:ext cx="1816560" cy="981720"/>
+              <a:ext cx="1816200" cy="981360"/>
             </a:xfrm>
             <a:prstGeom prst="rect">
               <a:avLst/>
@@ -9106,7 +9106,7 @@
           <p:spPr>
             <a:xfrm>
               <a:off x="626400" y="484200"/>
-              <a:ext cx="1504440" cy="523080"/>
+              <a:ext cx="1504080" cy="522720"/>
             </a:xfrm>
             <a:prstGeom prst="rect">
               <a:avLst/>
@@ -9126,7 +9126,7 @@
         <p:spPr>
           <a:xfrm>
             <a:off x="1440000" y="1080000"/>
-            <a:ext cx="9359640" cy="638280"/>
+            <a:ext cx="9359280" cy="638280"/>
           </a:xfrm>
           <a:prstGeom prst="rect">
             <a:avLst/>
@@ -9189,7 +9189,7 @@
         <p:spPr>
           <a:xfrm>
             <a:off x="1271880" y="1232280"/>
-            <a:ext cx="3947760" cy="486360"/>
+            <a:ext cx="3947400" cy="486000"/>
           </a:xfrm>
           <a:prstGeom prst="rect">
             <a:avLst/>
@@ -9237,7 +9237,7 @@
         <p:spPr>
           <a:xfrm>
             <a:off x="203760" y="2520000"/>
-            <a:ext cx="4476240" cy="2781000"/>
+            <a:ext cx="4475880" cy="2780640"/>
           </a:xfrm>
           <a:prstGeom prst="rect">
             <a:avLst/>
@@ -9255,13 +9255,13 @@
         </p:nvPicPr>
         <p:blipFill>
           <a:blip r:embed="rId7"/>
-          <a:srcRect l="0" t="0" r="51747" b="0"/>
+          <a:srcRect l="0" t="0" r="51740" b="0"/>
           <a:stretch/>
         </p:blipFill>
         <p:spPr>
           <a:xfrm>
             <a:off x="4860000" y="1925640"/>
-            <a:ext cx="2879640" cy="4913280"/>
+            <a:ext cx="2879280" cy="4912920"/>
           </a:xfrm>
           <a:prstGeom prst="rect">
             <a:avLst/>
@@ -9284,7 +9284,7 @@
         <p:spPr>
           <a:xfrm>
             <a:off x="7869240" y="2963880"/>
-            <a:ext cx="4190760" cy="2076120"/>
+            <a:ext cx="4190400" cy="2075760"/>
           </a:xfrm>
           <a:prstGeom prst="rect">
             <a:avLst/>
@@ -9333,9 +9333,9 @@
         <p:grpSpPr>
           <a:xfrm>
             <a:off x="360" y="-17640"/>
-            <a:ext cx="12190680" cy="6856560"/>
+            <a:ext cx="12190320" cy="6856200"/>
             <a:chOff x="360" y="-17640"/>
-            <a:chExt cx="12190680" cy="6856560"/>
+            <a:chExt cx="12190320" cy="6856200"/>
           </a:xfrm>
         </p:grpSpPr>
         <p:pic>
@@ -9352,7 +9352,7 @@
           <p:spPr>
             <a:xfrm>
               <a:off x="360" y="-17640"/>
-              <a:ext cx="12190680" cy="6856560"/>
+              <a:ext cx="12190320" cy="6856200"/>
             </a:xfrm>
             <a:prstGeom prst="rect">
               <a:avLst/>
@@ -9375,7 +9375,7 @@
           <p:spPr>
             <a:xfrm>
               <a:off x="360" y="-17640"/>
-              <a:ext cx="12190680" cy="6856560"/>
+              <a:ext cx="12190320" cy="6856200"/>
             </a:xfrm>
             <a:prstGeom prst="rect">
               <a:avLst/>
@@ -9399,7 +9399,7 @@
         <p:spPr>
           <a:xfrm>
             <a:off x="4815360" y="165600"/>
-            <a:ext cx="2337840" cy="1119240"/>
+            <a:ext cx="2337480" cy="1118880"/>
           </a:xfrm>
           <a:prstGeom prst="rect">
             <a:avLst/>
@@ -9418,9 +9418,9 @@
         <p:grpSpPr>
           <a:xfrm>
             <a:off x="626400" y="254520"/>
-            <a:ext cx="11250000" cy="981720"/>
+            <a:ext cx="11249640" cy="981360"/>
             <a:chOff x="626400" y="254520"/>
-            <a:chExt cx="11250000" cy="981720"/>
+            <a:chExt cx="11249640" cy="981360"/>
           </a:xfrm>
         </p:grpSpPr>
         <p:pic>
@@ -9436,7 +9436,7 @@
           <p:spPr>
             <a:xfrm>
               <a:off x="10059840" y="254520"/>
-              <a:ext cx="1816560" cy="981720"/>
+              <a:ext cx="1816200" cy="981360"/>
             </a:xfrm>
             <a:prstGeom prst="rect">
               <a:avLst/>
@@ -9459,7 +9459,7 @@
           <p:spPr>
             <a:xfrm>
               <a:off x="626400" y="484200"/>
-              <a:ext cx="1504440" cy="523080"/>
+              <a:ext cx="1504080" cy="522720"/>
             </a:xfrm>
             <a:prstGeom prst="rect">
               <a:avLst/>
@@ -9479,7 +9479,7 @@
         <p:spPr>
           <a:xfrm>
             <a:off x="1440000" y="1080000"/>
-            <a:ext cx="9359640" cy="638280"/>
+            <a:ext cx="9359280" cy="638280"/>
           </a:xfrm>
           <a:prstGeom prst="rect">
             <a:avLst/>
@@ -9542,7 +9542,7 @@
         <p:spPr>
           <a:xfrm>
             <a:off x="1271880" y="1232280"/>
-            <a:ext cx="3947760" cy="486360"/>
+            <a:ext cx="3947400" cy="486000"/>
           </a:xfrm>
           <a:prstGeom prst="rect">
             <a:avLst/>
@@ -9563,6 +9563,11 @@
             <a:noAutofit/>
           </a:bodyPr>
           <a:p>
+            <a:pPr>
+              <a:lnSpc>
+                <a:spcPct val="100000"/>
+              </a:lnSpc>
+            </a:pPr>
             <a:endParaRPr b="0" lang="es-CO" sz="1800" spc="-1" strike="noStrike">
               <a:solidFill>
                 <a:srgbClr val="000000"/>
@@ -9585,7 +9590,7 @@
         <p:spPr>
           <a:xfrm>
             <a:off x="180000" y="1980000"/>
-            <a:ext cx="5671440" cy="3963240"/>
+            <a:ext cx="5671080" cy="3962880"/>
           </a:xfrm>
           <a:prstGeom prst="rect">
             <a:avLst/>
@@ -9608,7 +9613,7 @@
         <p:spPr>
           <a:xfrm>
             <a:off x="6120000" y="2700000"/>
-            <a:ext cx="5848200" cy="2602800"/>
+            <a:ext cx="5847840" cy="2602440"/>
           </a:xfrm>
           <a:prstGeom prst="rect">
             <a:avLst/>
@@ -9657,9 +9662,9 @@
         <p:grpSpPr>
           <a:xfrm>
             <a:off x="360" y="-17640"/>
-            <a:ext cx="12190680" cy="6856560"/>
+            <a:ext cx="12190320" cy="6856200"/>
             <a:chOff x="360" y="-17640"/>
-            <a:chExt cx="12190680" cy="6856560"/>
+            <a:chExt cx="12190320" cy="6856200"/>
           </a:xfrm>
         </p:grpSpPr>
         <p:pic>
@@ -9676,7 +9681,7 @@
           <p:spPr>
             <a:xfrm>
               <a:off x="360" y="-17640"/>
-              <a:ext cx="12190680" cy="6856560"/>
+              <a:ext cx="12190320" cy="6856200"/>
             </a:xfrm>
             <a:prstGeom prst="rect">
               <a:avLst/>
@@ -9699,7 +9704,7 @@
           <p:spPr>
             <a:xfrm>
               <a:off x="360" y="-17640"/>
-              <a:ext cx="12190680" cy="6856560"/>
+              <a:ext cx="12190320" cy="6856200"/>
             </a:xfrm>
             <a:prstGeom prst="rect">
               <a:avLst/>
@@ -9723,7 +9728,7 @@
         <p:spPr>
           <a:xfrm>
             <a:off x="4815360" y="165600"/>
-            <a:ext cx="2337840" cy="1119240"/>
+            <a:ext cx="2337480" cy="1118880"/>
           </a:xfrm>
           <a:prstGeom prst="rect">
             <a:avLst/>
@@ -9742,9 +9747,9 @@
         <p:grpSpPr>
           <a:xfrm>
             <a:off x="626400" y="254520"/>
-            <a:ext cx="11250000" cy="981720"/>
+            <a:ext cx="11249640" cy="981360"/>
             <a:chOff x="626400" y="254520"/>
-            <a:chExt cx="11250000" cy="981720"/>
+            <a:chExt cx="11249640" cy="981360"/>
           </a:xfrm>
         </p:grpSpPr>
         <p:pic>
@@ -9760,7 +9765,7 @@
           <p:spPr>
             <a:xfrm>
               <a:off x="10059840" y="254520"/>
-              <a:ext cx="1816560" cy="981720"/>
+              <a:ext cx="1816200" cy="981360"/>
             </a:xfrm>
             <a:prstGeom prst="rect">
               <a:avLst/>
@@ -9783,7 +9788,7 @@
           <p:spPr>
             <a:xfrm>
               <a:off x="626400" y="484200"/>
-              <a:ext cx="1504440" cy="523080"/>
+              <a:ext cx="1504080" cy="522720"/>
             </a:xfrm>
             <a:prstGeom prst="rect">
               <a:avLst/>
@@ -9803,7 +9808,7 @@
         <p:spPr>
           <a:xfrm>
             <a:off x="1440000" y="1080000"/>
-            <a:ext cx="9359640" cy="638280"/>
+            <a:ext cx="9359280" cy="638280"/>
           </a:xfrm>
           <a:prstGeom prst="rect">
             <a:avLst/>
@@ -9866,7 +9871,7 @@
         <p:spPr>
           <a:xfrm>
             <a:off x="1271880" y="1232280"/>
-            <a:ext cx="3947760" cy="486360"/>
+            <a:ext cx="3947400" cy="486000"/>
           </a:xfrm>
           <a:prstGeom prst="rect">
             <a:avLst/>
@@ -9887,6 +9892,11 @@
             <a:noAutofit/>
           </a:bodyPr>
           <a:p>
+            <a:pPr>
+              <a:lnSpc>
+                <a:spcPct val="100000"/>
+              </a:lnSpc>
+            </a:pPr>
             <a:endParaRPr b="0" lang="es-CO" sz="1800" spc="-1" strike="noStrike">
               <a:solidFill>
                 <a:srgbClr val="000000"/>
@@ -9909,7 +9919,7 @@
         <p:spPr>
           <a:xfrm>
             <a:off x="6344640" y="3240000"/>
-            <a:ext cx="5535360" cy="1942200"/>
+            <a:ext cx="5535000" cy="1941840"/>
           </a:xfrm>
           <a:prstGeom prst="rect">
             <a:avLst/>
@@ -9932,7 +9942,7 @@
         <p:spPr>
           <a:xfrm>
             <a:off x="91080" y="2916000"/>
-            <a:ext cx="6028920" cy="2761920"/>
+            <a:ext cx="6028560" cy="2761560"/>
           </a:xfrm>
           <a:prstGeom prst="rect">
             <a:avLst/>
@@ -9981,9 +9991,9 @@
         <p:grpSpPr>
           <a:xfrm>
             <a:off x="360" y="-17640"/>
-            <a:ext cx="12190680" cy="6856560"/>
+            <a:ext cx="12190320" cy="6856200"/>
             <a:chOff x="360" y="-17640"/>
-            <a:chExt cx="12190680" cy="6856560"/>
+            <a:chExt cx="12190320" cy="6856200"/>
           </a:xfrm>
         </p:grpSpPr>
         <p:pic>
@@ -10000,7 +10010,7 @@
           <p:spPr>
             <a:xfrm>
               <a:off x="360" y="-17640"/>
-              <a:ext cx="12190680" cy="6856560"/>
+              <a:ext cx="12190320" cy="6856200"/>
             </a:xfrm>
             <a:prstGeom prst="rect">
               <a:avLst/>
@@ -10023,7 +10033,7 @@
           <p:spPr>
             <a:xfrm>
               <a:off x="360" y="-17640"/>
-              <a:ext cx="12190680" cy="6856560"/>
+              <a:ext cx="12190320" cy="6856200"/>
             </a:xfrm>
             <a:prstGeom prst="rect">
               <a:avLst/>
@@ -10047,7 +10057,7 @@
         <p:spPr>
           <a:xfrm>
             <a:off x="4815360" y="165600"/>
-            <a:ext cx="2337840" cy="1119240"/>
+            <a:ext cx="2337480" cy="1118880"/>
           </a:xfrm>
           <a:prstGeom prst="rect">
             <a:avLst/>
@@ -10066,9 +10076,9 @@
         <p:grpSpPr>
           <a:xfrm>
             <a:off x="626400" y="254520"/>
-            <a:ext cx="11250000" cy="981720"/>
+            <a:ext cx="11249640" cy="981360"/>
             <a:chOff x="626400" y="254520"/>
-            <a:chExt cx="11250000" cy="981720"/>
+            <a:chExt cx="11249640" cy="981360"/>
           </a:xfrm>
         </p:grpSpPr>
         <p:pic>
@@ -10084,7 +10094,7 @@
           <p:spPr>
             <a:xfrm>
               <a:off x="10059840" y="254520"/>
-              <a:ext cx="1816560" cy="981720"/>
+              <a:ext cx="1816200" cy="981360"/>
             </a:xfrm>
             <a:prstGeom prst="rect">
               <a:avLst/>
@@ -10107,7 +10117,7 @@
           <p:spPr>
             <a:xfrm>
               <a:off x="626400" y="484200"/>
-              <a:ext cx="1504440" cy="523080"/>
+              <a:ext cx="1504080" cy="522720"/>
             </a:xfrm>
             <a:prstGeom prst="rect">
               <a:avLst/>
@@ -10127,7 +10137,7 @@
         <p:spPr>
           <a:xfrm>
             <a:off x="1440000" y="1080000"/>
-            <a:ext cx="9359640" cy="638280"/>
+            <a:ext cx="9359280" cy="638280"/>
           </a:xfrm>
           <a:prstGeom prst="rect">
             <a:avLst/>
@@ -10190,7 +10200,7 @@
         <p:spPr>
           <a:xfrm>
             <a:off x="1271880" y="1232280"/>
-            <a:ext cx="3947760" cy="486360"/>
+            <a:ext cx="3947400" cy="486000"/>
           </a:xfrm>
           <a:prstGeom prst="rect">
             <a:avLst/>
@@ -10211,6 +10221,11 @@
             <a:noAutofit/>
           </a:bodyPr>
           <a:p>
+            <a:pPr>
+              <a:lnSpc>
+                <a:spcPct val="100000"/>
+              </a:lnSpc>
+            </a:pPr>
             <a:endParaRPr b="0" lang="es-CO" sz="1800" spc="-1" strike="noStrike">
               <a:solidFill>
                 <a:srgbClr val="000000"/>
@@ -10233,7 +10248,7 @@
         <p:spPr>
           <a:xfrm>
             <a:off x="6937920" y="3240000"/>
-            <a:ext cx="4762080" cy="1371240"/>
+            <a:ext cx="4761720" cy="1370880"/>
           </a:xfrm>
           <a:prstGeom prst="rect">
             <a:avLst/>
@@ -10256,7 +10271,7 @@
         <p:spPr>
           <a:xfrm>
             <a:off x="651960" y="2840040"/>
-            <a:ext cx="5648040" cy="2199960"/>
+            <a:ext cx="5647680" cy="2199600"/>
           </a:xfrm>
           <a:prstGeom prst="rect">
             <a:avLst/>
@@ -10305,9 +10320,9 @@
         <p:grpSpPr>
           <a:xfrm>
             <a:off x="360" y="-17640"/>
-            <a:ext cx="12190680" cy="6856560"/>
+            <a:ext cx="12190320" cy="6856200"/>
             <a:chOff x="360" y="-17640"/>
-            <a:chExt cx="12190680" cy="6856560"/>
+            <a:chExt cx="12190320" cy="6856200"/>
           </a:xfrm>
         </p:grpSpPr>
         <p:pic>
@@ -10324,7 +10339,7 @@
           <p:spPr>
             <a:xfrm>
               <a:off x="360" y="-17640"/>
-              <a:ext cx="12190680" cy="6856560"/>
+              <a:ext cx="12190320" cy="6856200"/>
             </a:xfrm>
             <a:prstGeom prst="rect">
               <a:avLst/>
@@ -10347,7 +10362,7 @@
           <p:spPr>
             <a:xfrm>
               <a:off x="360" y="-17640"/>
-              <a:ext cx="12190680" cy="6856560"/>
+              <a:ext cx="12190320" cy="6856200"/>
             </a:xfrm>
             <a:prstGeom prst="rect">
               <a:avLst/>
@@ -10371,7 +10386,7 @@
         <p:spPr>
           <a:xfrm>
             <a:off x="4815360" y="165600"/>
-            <a:ext cx="2337840" cy="1119240"/>
+            <a:ext cx="2337480" cy="1118880"/>
           </a:xfrm>
           <a:prstGeom prst="rect">
             <a:avLst/>
@@ -10390,9 +10405,9 @@
         <p:grpSpPr>
           <a:xfrm>
             <a:off x="626400" y="254520"/>
-            <a:ext cx="11250000" cy="981720"/>
+            <a:ext cx="11249640" cy="981360"/>
             <a:chOff x="626400" y="254520"/>
-            <a:chExt cx="11250000" cy="981720"/>
+            <a:chExt cx="11249640" cy="981360"/>
           </a:xfrm>
         </p:grpSpPr>
         <p:pic>
@@ -10408,7 +10423,7 @@
           <p:spPr>
             <a:xfrm>
               <a:off x="10059840" y="254520"/>
-              <a:ext cx="1816560" cy="981720"/>
+              <a:ext cx="1816200" cy="981360"/>
             </a:xfrm>
             <a:prstGeom prst="rect">
               <a:avLst/>
@@ -10431,7 +10446,7 @@
           <p:spPr>
             <a:xfrm>
               <a:off x="626400" y="484200"/>
-              <a:ext cx="1504440" cy="523080"/>
+              <a:ext cx="1504080" cy="522720"/>
             </a:xfrm>
             <a:prstGeom prst="rect">
               <a:avLst/>
@@ -10451,7 +10466,7 @@
         <p:spPr>
           <a:xfrm>
             <a:off x="1440000" y="1080000"/>
-            <a:ext cx="9359640" cy="638280"/>
+            <a:ext cx="9359280" cy="638280"/>
           </a:xfrm>
           <a:prstGeom prst="rect">
             <a:avLst/>
@@ -10514,7 +10529,7 @@
         <p:spPr>
           <a:xfrm>
             <a:off x="1271880" y="1232280"/>
-            <a:ext cx="3947760" cy="486360"/>
+            <a:ext cx="3947400" cy="486000"/>
           </a:xfrm>
           <a:prstGeom prst="rect">
             <a:avLst/>
@@ -10535,6 +10550,11 @@
             <a:noAutofit/>
           </a:bodyPr>
           <a:p>
+            <a:pPr>
+              <a:lnSpc>
+                <a:spcPct val="100000"/>
+              </a:lnSpc>
+            </a:pPr>
             <a:endParaRPr b="0" lang="es-CO" sz="1800" spc="-1" strike="noStrike">
               <a:solidFill>
                 <a:srgbClr val="000000"/>
@@ -10557,7 +10577,7 @@
         <p:spPr>
           <a:xfrm>
             <a:off x="1623960" y="1980000"/>
-            <a:ext cx="8096040" cy="4190760"/>
+            <a:ext cx="8095680" cy="4190400"/>
           </a:xfrm>
           <a:prstGeom prst="rect">
             <a:avLst/>
@@ -10606,9 +10626,9 @@
         <p:grpSpPr>
           <a:xfrm>
             <a:off x="360" y="-17640"/>
-            <a:ext cx="12190680" cy="6856560"/>
+            <a:ext cx="12190320" cy="6856200"/>
             <a:chOff x="360" y="-17640"/>
-            <a:chExt cx="12190680" cy="6856560"/>
+            <a:chExt cx="12190320" cy="6856200"/>
           </a:xfrm>
         </p:grpSpPr>
         <p:pic>
@@ -10625,7 +10645,7 @@
           <p:spPr>
             <a:xfrm>
               <a:off x="360" y="-17640"/>
-              <a:ext cx="12190680" cy="6856560"/>
+              <a:ext cx="12190320" cy="6856200"/>
             </a:xfrm>
             <a:prstGeom prst="rect">
               <a:avLst/>
@@ -10648,7 +10668,7 @@
           <p:spPr>
             <a:xfrm>
               <a:off x="360" y="-17640"/>
-              <a:ext cx="12190680" cy="6856560"/>
+              <a:ext cx="12190320" cy="6856200"/>
             </a:xfrm>
             <a:prstGeom prst="rect">
               <a:avLst/>
@@ -10672,7 +10692,7 @@
         <p:spPr>
           <a:xfrm>
             <a:off x="4815360" y="165600"/>
-            <a:ext cx="2337840" cy="1119240"/>
+            <a:ext cx="2337480" cy="1118880"/>
           </a:xfrm>
           <a:prstGeom prst="rect">
             <a:avLst/>
@@ -10691,9 +10711,9 @@
         <p:grpSpPr>
           <a:xfrm>
             <a:off x="626400" y="254520"/>
-            <a:ext cx="11250000" cy="981720"/>
+            <a:ext cx="11249640" cy="981360"/>
             <a:chOff x="626400" y="254520"/>
-            <a:chExt cx="11250000" cy="981720"/>
+            <a:chExt cx="11249640" cy="981360"/>
           </a:xfrm>
         </p:grpSpPr>
         <p:pic>
@@ -10709,7 +10729,7 @@
           <p:spPr>
             <a:xfrm>
               <a:off x="10059840" y="254520"/>
-              <a:ext cx="1816560" cy="981720"/>
+              <a:ext cx="1816200" cy="981360"/>
             </a:xfrm>
             <a:prstGeom prst="rect">
               <a:avLst/>
@@ -10732,7 +10752,7 @@
           <p:spPr>
             <a:xfrm>
               <a:off x="626400" y="484200"/>
-              <a:ext cx="1504440" cy="523080"/>
+              <a:ext cx="1504080" cy="522720"/>
             </a:xfrm>
             <a:prstGeom prst="rect">
               <a:avLst/>
@@ -10752,7 +10772,7 @@
         <p:spPr>
           <a:xfrm>
             <a:off x="1440000" y="1080000"/>
-            <a:ext cx="9359640" cy="638280"/>
+            <a:ext cx="9359280" cy="638280"/>
           </a:xfrm>
           <a:prstGeom prst="rect">
             <a:avLst/>
@@ -10815,7 +10835,7 @@
         <p:spPr>
           <a:xfrm>
             <a:off x="1271880" y="1232280"/>
-            <a:ext cx="3947760" cy="486360"/>
+            <a:ext cx="3947400" cy="486000"/>
           </a:xfrm>
           <a:prstGeom prst="rect">
             <a:avLst/>
@@ -10836,6 +10856,11 @@
             <a:noAutofit/>
           </a:bodyPr>
           <a:p>
+            <a:pPr>
+              <a:lnSpc>
+                <a:spcPct val="100000"/>
+              </a:lnSpc>
+            </a:pPr>
             <a:endParaRPr b="0" lang="es-CO" sz="1800" spc="-1" strike="noStrike">
               <a:solidFill>
                 <a:srgbClr val="000000"/>
@@ -10858,7 +10883,7 @@
         <p:spPr>
           <a:xfrm>
             <a:off x="3060000" y="2520000"/>
-            <a:ext cx="5797440" cy="3086640"/>
+            <a:ext cx="5797080" cy="3086280"/>
           </a:xfrm>
           <a:prstGeom prst="rect">
             <a:avLst/>
@@ -10907,9 +10932,9 @@
         <p:grpSpPr>
           <a:xfrm>
             <a:off x="360" y="-17640"/>
-            <a:ext cx="12190680" cy="6856560"/>
+            <a:ext cx="12190320" cy="6856200"/>
             <a:chOff x="360" y="-17640"/>
-            <a:chExt cx="12190680" cy="6856560"/>
+            <a:chExt cx="12190320" cy="6856200"/>
           </a:xfrm>
         </p:grpSpPr>
         <p:pic>
@@ -10926,7 +10951,7 @@
           <p:spPr>
             <a:xfrm>
               <a:off x="360" y="-17640"/>
-              <a:ext cx="12190680" cy="6856560"/>
+              <a:ext cx="12190320" cy="6856200"/>
             </a:xfrm>
             <a:prstGeom prst="rect">
               <a:avLst/>
@@ -10949,7 +10974,7 @@
           <p:spPr>
             <a:xfrm>
               <a:off x="360" y="-17640"/>
-              <a:ext cx="12190680" cy="6856560"/>
+              <a:ext cx="12190320" cy="6856200"/>
             </a:xfrm>
             <a:prstGeom prst="rect">
               <a:avLst/>
@@ -10973,7 +10998,7 @@
         <p:spPr>
           <a:xfrm>
             <a:off x="4815360" y="165600"/>
-            <a:ext cx="2337840" cy="1119240"/>
+            <a:ext cx="2337480" cy="1118880"/>
           </a:xfrm>
           <a:prstGeom prst="rect">
             <a:avLst/>
@@ -10992,9 +11017,9 @@
         <p:grpSpPr>
           <a:xfrm>
             <a:off x="626400" y="254520"/>
-            <a:ext cx="11250000" cy="981720"/>
+            <a:ext cx="11249640" cy="981360"/>
             <a:chOff x="626400" y="254520"/>
-            <a:chExt cx="11250000" cy="981720"/>
+            <a:chExt cx="11249640" cy="981360"/>
           </a:xfrm>
         </p:grpSpPr>
         <p:pic>
@@ -11010,7 +11035,7 @@
           <p:spPr>
             <a:xfrm>
               <a:off x="10059840" y="254520"/>
-              <a:ext cx="1816560" cy="981720"/>
+              <a:ext cx="1816200" cy="981360"/>
             </a:xfrm>
             <a:prstGeom prst="rect">
               <a:avLst/>
@@ -11033,7 +11058,7 @@
           <p:spPr>
             <a:xfrm>
               <a:off x="626400" y="484200"/>
-              <a:ext cx="1504440" cy="523080"/>
+              <a:ext cx="1504080" cy="522720"/>
             </a:xfrm>
             <a:prstGeom prst="rect">
               <a:avLst/>
@@ -11053,7 +11078,7 @@
         <p:spPr>
           <a:xfrm>
             <a:off x="1440000" y="1080000"/>
-            <a:ext cx="9359640" cy="638280"/>
+            <a:ext cx="9359280" cy="638280"/>
           </a:xfrm>
           <a:prstGeom prst="rect">
             <a:avLst/>
@@ -11116,7 +11141,7 @@
         <p:spPr>
           <a:xfrm>
             <a:off x="1271880" y="1232280"/>
-            <a:ext cx="3947760" cy="486360"/>
+            <a:ext cx="3947400" cy="486000"/>
           </a:xfrm>
           <a:prstGeom prst="rect">
             <a:avLst/>
@@ -11137,6 +11162,11 @@
             <a:noAutofit/>
           </a:bodyPr>
           <a:p>
+            <a:pPr>
+              <a:lnSpc>
+                <a:spcPct val="100000"/>
+              </a:lnSpc>
+            </a:pPr>
             <a:endParaRPr b="0" lang="es-CO" sz="1800" spc="-1" strike="noStrike">
               <a:solidFill>
                 <a:srgbClr val="000000"/>
@@ -11159,7 +11189,7 @@
         <p:spPr>
           <a:xfrm>
             <a:off x="1931760" y="2083320"/>
-            <a:ext cx="7968240" cy="4216680"/>
+            <a:ext cx="7967880" cy="4216320"/>
           </a:xfrm>
           <a:prstGeom prst="rect">
             <a:avLst/>

</xml_diff>